<commit_message>
Powerpoint färdig + film
</commit_message>
<xml_diff>
--- a/PowerPoint/Easy Speech.pptx
+++ b/PowerPoint/Easy Speech.pptx
@@ -9,11 +9,21 @@
     <p:sldId id="259" r:id="rId3"/>
     <p:sldId id="257" r:id="rId4"/>
     <p:sldId id="258" r:id="rId5"/>
-    <p:sldId id="260" r:id="rId6"/>
-    <p:sldId id="262" r:id="rId7"/>
-    <p:sldId id="261" r:id="rId8"/>
-    <p:sldId id="263" r:id="rId9"/>
-    <p:sldId id="264" r:id="rId10"/>
+    <p:sldId id="265" r:id="rId6"/>
+    <p:sldId id="266" r:id="rId7"/>
+    <p:sldId id="267" r:id="rId8"/>
+    <p:sldId id="268" r:id="rId9"/>
+    <p:sldId id="260" r:id="rId10"/>
+    <p:sldId id="262" r:id="rId11"/>
+    <p:sldId id="269" r:id="rId12"/>
+    <p:sldId id="261" r:id="rId13"/>
+    <p:sldId id="263" r:id="rId14"/>
+    <p:sldId id="271" r:id="rId15"/>
+    <p:sldId id="270" r:id="rId16"/>
+    <p:sldId id="272" r:id="rId17"/>
+    <p:sldId id="273" r:id="rId18"/>
+    <p:sldId id="274" r:id="rId19"/>
+    <p:sldId id="275" r:id="rId20"/>
   </p:sldIdLst>
   <p:sldSz cx="9144000" cy="6858000" type="screen4x3"/>
   <p:notesSz cx="6858000" cy="9144000"/>
@@ -4140,7 +4150,7 @@
 </p:sld>
 </file>
 
-<file path=ppt/slides/slide2.xml><?xml version="1.0" encoding="utf-8"?>
+<file path=ppt/slides/slide10.xml><?xml version="1.0" encoding="utf-8"?>
 <p:sld xmlns:a="http://schemas.openxmlformats.org/drawingml/2006/main" xmlns:r="http://schemas.openxmlformats.org/officeDocument/2006/relationships" xmlns:p="http://schemas.openxmlformats.org/presentationml/2006/main">
   <p:cSld>
     <p:spTree>
@@ -4167,402 +4177,28 @@
             <p:ph type="title"/>
           </p:nvPr>
         </p:nvSpPr>
-        <p:spPr/>
-        <p:txBody>
-          <a:bodyPr>
-            <a:normAutofit/>
-          </a:bodyPr>
-          <a:lstStyle/>
-          <a:p>
-            <a:pPr algn="ctr"/>
-            <a:r>
-              <a:rPr lang="sv-SE" sz="5500" dirty="0" smtClean="0"/>
-              <a:t>Topics covered</a:t>
-            </a:r>
-            <a:endParaRPr lang="sv-SE" sz="5500" dirty="0"/>
-          </a:p>
-        </p:txBody>
-      </p:sp>
-      <p:sp>
-        <p:nvSpPr>
-          <p:cNvPr id="3" name="Content Placeholder 2"/>
-          <p:cNvSpPr>
-            <a:spLocks noGrp="1"/>
-          </p:cNvSpPr>
-          <p:nvPr>
-            <p:ph idx="1"/>
-          </p:nvPr>
-        </p:nvSpPr>
-        <p:spPr/>
-        <p:txBody>
-          <a:bodyPr>
-            <a:normAutofit/>
-          </a:bodyPr>
-          <a:lstStyle/>
-          <a:p>
-            <a:r>
-              <a:rPr lang="sv-SE" sz="3000" dirty="0" smtClean="0"/>
-              <a:t>Introduction</a:t>
-            </a:r>
-            <a:endParaRPr lang="sv-SE" sz="3000" dirty="0" smtClean="0"/>
-          </a:p>
-          <a:p>
-            <a:r>
-              <a:rPr lang="sv-SE" sz="3000" dirty="0" smtClean="0"/>
-              <a:t>Aim and purpose</a:t>
-            </a:r>
-            <a:endParaRPr lang="sv-SE" sz="3000" dirty="0" smtClean="0"/>
-          </a:p>
-          <a:p>
-            <a:r>
-              <a:rPr lang="sv-SE" sz="3000" dirty="0" smtClean="0"/>
-              <a:t>Method and implementation</a:t>
-            </a:r>
-            <a:endParaRPr lang="sv-SE" sz="3000" dirty="0" smtClean="0"/>
-          </a:p>
-          <a:p>
-            <a:r>
-              <a:rPr lang="sv-SE" sz="3000" dirty="0" smtClean="0"/>
-              <a:t>Results from this project</a:t>
-            </a:r>
-          </a:p>
-          <a:p>
-            <a:r>
-              <a:rPr lang="sv-SE" sz="3000" dirty="0" smtClean="0"/>
-              <a:t>Discussion</a:t>
-            </a:r>
-          </a:p>
-          <a:p>
-            <a:r>
-              <a:rPr lang="sv-SE" sz="3000" dirty="0" smtClean="0"/>
-              <a:t>Further work</a:t>
-            </a:r>
-            <a:endParaRPr lang="sv-SE" sz="3000" dirty="0"/>
-          </a:p>
-        </p:txBody>
-      </p:sp>
-    </p:spTree>
-    <p:extLst>
-      <p:ext uri="{BB962C8B-B14F-4D97-AF65-F5344CB8AC3E}">
-        <p14:creationId xmlns:p14="http://schemas.microsoft.com/office/powerpoint/2010/main" val="3119092434"/>
-      </p:ext>
-    </p:extLst>
-  </p:cSld>
-  <p:clrMapOvr>
-    <a:masterClrMapping/>
-  </p:clrMapOvr>
-  <p:timing>
-    <p:tnLst>
-      <p:par>
-        <p:cTn id="1" dur="indefinite" restart="never" nodeType="tmRoot"/>
-      </p:par>
-    </p:tnLst>
-  </p:timing>
-</p:sld>
-</file>
-
-<file path=ppt/slides/slide3.xml><?xml version="1.0" encoding="utf-8"?>
-<p:sld xmlns:a="http://schemas.openxmlformats.org/drawingml/2006/main" xmlns:r="http://schemas.openxmlformats.org/officeDocument/2006/relationships" xmlns:p="http://schemas.openxmlformats.org/presentationml/2006/main">
-  <p:cSld>
-    <p:spTree>
-      <p:nvGrpSpPr>
-        <p:cNvPr id="1" name=""/>
-        <p:cNvGrpSpPr/>
-        <p:nvPr/>
-      </p:nvGrpSpPr>
-      <p:grpSpPr>
-        <a:xfrm>
-          <a:off x="0" y="0"/>
-          <a:ext cx="0" cy="0"/>
-          <a:chOff x="0" y="0"/>
-          <a:chExt cx="0" cy="0"/>
-        </a:xfrm>
-      </p:grpSpPr>
-      <p:sp>
-        <p:nvSpPr>
-          <p:cNvPr id="2" name="Title 1"/>
-          <p:cNvSpPr>
-            <a:spLocks noGrp="1"/>
-          </p:cNvSpPr>
-          <p:nvPr>
-            <p:ph type="title"/>
-          </p:nvPr>
-        </p:nvSpPr>
-        <p:spPr/>
-        <p:txBody>
-          <a:bodyPr>
-            <a:normAutofit/>
-          </a:bodyPr>
-          <a:lstStyle/>
-          <a:p>
-            <a:pPr algn="ctr"/>
-            <a:r>
-              <a:rPr lang="sv-SE" sz="5500" dirty="0"/>
-              <a:t>The starting idea</a:t>
-            </a:r>
-          </a:p>
-        </p:txBody>
-      </p:sp>
-      <p:sp>
-        <p:nvSpPr>
-          <p:cNvPr id="3" name="Content Placeholder 2"/>
-          <p:cNvSpPr>
-            <a:spLocks noGrp="1"/>
-          </p:cNvSpPr>
-          <p:nvPr>
-            <p:ph idx="1"/>
-          </p:nvPr>
-        </p:nvSpPr>
-        <p:spPr/>
-        <p:txBody>
-          <a:bodyPr/>
-          <a:lstStyle/>
-          <a:p>
-            <a:r>
-              <a:rPr lang="sv-SE" sz="4400" dirty="0" smtClean="0"/>
-              <a:t>A voice activated robot </a:t>
-            </a:r>
-          </a:p>
-          <a:p>
-            <a:r>
-              <a:rPr lang="sv-SE" sz="4400" dirty="0" smtClean="0"/>
-              <a:t>Voice recognition in C</a:t>
-            </a:r>
-          </a:p>
-          <a:p>
-            <a:r>
-              <a:rPr lang="sv-SE" sz="4400" dirty="0" smtClean="0"/>
-              <a:t>Robot recognizes different users </a:t>
-            </a:r>
-          </a:p>
-          <a:p>
-            <a:r>
-              <a:rPr lang="sv-SE" sz="4400" dirty="0" smtClean="0"/>
-              <a:t>Gives a voice feedback depending on user</a:t>
-            </a:r>
-          </a:p>
-          <a:p>
-            <a:endParaRPr lang="sv-SE" dirty="0" smtClean="0"/>
-          </a:p>
-          <a:p>
-            <a:endParaRPr lang="sv-SE" dirty="0"/>
-          </a:p>
-        </p:txBody>
-      </p:sp>
-    </p:spTree>
-    <p:extLst>
-      <p:ext uri="{BB962C8B-B14F-4D97-AF65-F5344CB8AC3E}">
-        <p14:creationId xmlns:p14="http://schemas.microsoft.com/office/powerpoint/2010/main" val="4066557180"/>
-      </p:ext>
-    </p:extLst>
-  </p:cSld>
-  <p:clrMapOvr>
-    <a:masterClrMapping/>
-  </p:clrMapOvr>
-  <p:timing>
-    <p:tnLst>
-      <p:par>
-        <p:cTn id="1" dur="indefinite" restart="never" nodeType="tmRoot"/>
-      </p:par>
-    </p:tnLst>
-  </p:timing>
-</p:sld>
-</file>
-
-<file path=ppt/slides/slide4.xml><?xml version="1.0" encoding="utf-8"?>
-<p:sld xmlns:a="http://schemas.openxmlformats.org/drawingml/2006/main" xmlns:r="http://schemas.openxmlformats.org/officeDocument/2006/relationships" xmlns:p="http://schemas.openxmlformats.org/presentationml/2006/main">
-  <p:cSld>
-    <p:spTree>
-      <p:nvGrpSpPr>
-        <p:cNvPr id="1" name=""/>
-        <p:cNvGrpSpPr/>
-        <p:nvPr/>
-      </p:nvGrpSpPr>
-      <p:grpSpPr>
-        <a:xfrm>
-          <a:off x="0" y="0"/>
-          <a:ext cx="0" cy="0"/>
-          <a:chOff x="0" y="0"/>
-          <a:chExt cx="0" cy="0"/>
-        </a:xfrm>
-      </p:grpSpPr>
-      <p:sp>
-        <p:nvSpPr>
-          <p:cNvPr id="2" name="Title 1"/>
-          <p:cNvSpPr>
-            <a:spLocks noGrp="1"/>
-          </p:cNvSpPr>
-          <p:nvPr>
-            <p:ph type="title"/>
-          </p:nvPr>
-        </p:nvSpPr>
-        <p:spPr/>
-        <p:txBody>
-          <a:bodyPr>
-            <a:normAutofit/>
-          </a:bodyPr>
-          <a:lstStyle/>
-          <a:p>
-            <a:pPr algn="ctr"/>
-            <a:r>
-              <a:rPr lang="sv-SE" sz="5500" dirty="0" smtClean="0"/>
-              <a:t>The actual idea</a:t>
-            </a:r>
-            <a:endParaRPr lang="sv-SE" sz="5500" dirty="0"/>
-          </a:p>
-        </p:txBody>
-      </p:sp>
-      <p:sp>
-        <p:nvSpPr>
-          <p:cNvPr id="3" name="Content Placeholder 2"/>
-          <p:cNvSpPr>
-            <a:spLocks noGrp="1"/>
-          </p:cNvSpPr>
-          <p:nvPr>
-            <p:ph idx="1"/>
-          </p:nvPr>
-        </p:nvSpPr>
-        <p:spPr/>
-        <p:txBody>
-          <a:bodyPr>
-            <a:normAutofit lnSpcReduction="10000"/>
-          </a:bodyPr>
-          <a:lstStyle/>
-          <a:p>
-            <a:r>
-              <a:rPr lang="sv-SE" sz="4400" dirty="0" smtClean="0"/>
-              <a:t>Voice controlled robot </a:t>
-            </a:r>
-          </a:p>
-          <a:p>
-            <a:r>
-              <a:rPr lang="sv-SE" sz="4400" dirty="0" smtClean="0"/>
-              <a:t>Android(java) instead of C</a:t>
-            </a:r>
-          </a:p>
-          <a:p>
-            <a:r>
-              <a:rPr lang="sv-SE" sz="4400" dirty="0" smtClean="0"/>
-              <a:t>No recognition for different users </a:t>
-            </a:r>
-          </a:p>
-          <a:p>
-            <a:r>
-              <a:rPr lang="sv-SE" sz="4400" dirty="0" smtClean="0"/>
-              <a:t>No voice feedback from the robot </a:t>
-            </a:r>
-          </a:p>
-          <a:p>
-            <a:endParaRPr lang="sv-SE" dirty="0" smtClean="0"/>
-          </a:p>
-          <a:p>
-            <a:endParaRPr lang="sv-SE" dirty="0"/>
-          </a:p>
-        </p:txBody>
-      </p:sp>
-    </p:spTree>
-    <p:extLst>
-      <p:ext uri="{BB962C8B-B14F-4D97-AF65-F5344CB8AC3E}">
-        <p14:creationId xmlns:p14="http://schemas.microsoft.com/office/powerpoint/2010/main" val="2370076997"/>
-      </p:ext>
-    </p:extLst>
-  </p:cSld>
-  <p:clrMapOvr>
-    <a:masterClrMapping/>
-  </p:clrMapOvr>
-  <p:timing>
-    <p:tnLst>
-      <p:par>
-        <p:cTn id="1" dur="indefinite" restart="never" nodeType="tmRoot"/>
-      </p:par>
-    </p:tnLst>
-  </p:timing>
-</p:sld>
-</file>
-
-<file path=ppt/slides/slide5.xml><?xml version="1.0" encoding="utf-8"?>
-<p:sld xmlns:a="http://schemas.openxmlformats.org/drawingml/2006/main" xmlns:r="http://schemas.openxmlformats.org/officeDocument/2006/relationships" xmlns:p="http://schemas.openxmlformats.org/presentationml/2006/main">
-  <p:cSld>
-    <p:spTree>
-      <p:nvGrpSpPr>
-        <p:cNvPr id="1" name=""/>
-        <p:cNvGrpSpPr/>
-        <p:nvPr/>
-      </p:nvGrpSpPr>
-      <p:grpSpPr>
-        <a:xfrm>
-          <a:off x="0" y="0"/>
-          <a:ext cx="0" cy="0"/>
-          <a:chOff x="0" y="0"/>
-          <a:chExt cx="0" cy="0"/>
-        </a:xfrm>
-      </p:grpSpPr>
-      <p:sp>
-        <p:nvSpPr>
-          <p:cNvPr id="2" name="Title 1"/>
-          <p:cNvSpPr>
-            <a:spLocks noGrp="1"/>
-          </p:cNvSpPr>
-          <p:nvPr>
-            <p:ph type="title"/>
-          </p:nvPr>
-        </p:nvSpPr>
         <p:spPr>
           <a:xfrm>
-            <a:off x="755576" y="116632"/>
+            <a:off x="2555776" y="116632"/>
             <a:ext cx="8229600" cy="1143000"/>
           </a:xfrm>
         </p:spPr>
         <p:txBody>
-          <a:bodyPr>
-            <a:normAutofit/>
-          </a:bodyPr>
+          <a:bodyPr/>
           <a:lstStyle/>
           <a:p>
             <a:pPr algn="ctr"/>
             <a:r>
-              <a:rPr lang="sv-SE" sz="5500" dirty="0" smtClean="0"/>
-              <a:t>                Android</a:t>
-            </a:r>
-            <a:endParaRPr lang="sv-SE" sz="5500" dirty="0"/>
-          </a:p>
-        </p:txBody>
-      </p:sp>
-      <p:sp>
-        <p:nvSpPr>
-          <p:cNvPr id="5" name="Content Placeholder 4"/>
-          <p:cNvSpPr>
-            <a:spLocks noGrp="1"/>
-          </p:cNvSpPr>
-          <p:nvPr>
-            <p:ph sz="half" idx="2"/>
-          </p:nvPr>
-        </p:nvSpPr>
-        <p:spPr>
-          <a:xfrm>
-            <a:off x="4139952" y="1988840"/>
-            <a:ext cx="4038600" cy="4434840"/>
-          </a:xfrm>
-        </p:spPr>
-        <p:txBody>
-          <a:bodyPr>
-            <a:noAutofit/>
-          </a:bodyPr>
-          <a:lstStyle/>
-          <a:p>
-            <a:r>
-              <a:rPr lang="sv-SE" sz="2400" dirty="0" smtClean="0"/>
-              <a:t>This is the EasySpeech app</a:t>
-            </a:r>
-          </a:p>
-          <a:p>
-            <a:endParaRPr lang="sv-SE" sz="2400" dirty="0"/>
+              <a:rPr lang="sv-SE" dirty="0" smtClean="0"/>
+              <a:t>Bluetooth </a:t>
+            </a:r>
+            <a:endParaRPr lang="sv-SE" dirty="0"/>
           </a:p>
         </p:txBody>
       </p:sp>
       <p:pic>
         <p:nvPicPr>
-          <p:cNvPr id="7" name="Content Placeholder 6"/>
+          <p:cNvPr id="5" name="Content Placeholder 4"/>
           <p:cNvPicPr>
             <a:picLocks noGrp="1" noChangeAspect="1"/>
           </p:cNvPicPr>
@@ -4584,106 +4220,11 @@
         </p:blipFill>
         <p:spPr>
           <a:xfrm>
-            <a:off x="179512" y="188640"/>
-            <a:ext cx="3384361" cy="6120000"/>
+            <a:off x="-1" y="0"/>
+            <a:ext cx="3857625" cy="6858000"/>
           </a:xfrm>
         </p:spPr>
       </p:pic>
-    </p:spTree>
-    <p:extLst>
-      <p:ext uri="{BB962C8B-B14F-4D97-AF65-F5344CB8AC3E}">
-        <p14:creationId xmlns:p14="http://schemas.microsoft.com/office/powerpoint/2010/main" val="2615452909"/>
-      </p:ext>
-    </p:extLst>
-  </p:cSld>
-  <p:clrMapOvr>
-    <a:masterClrMapping/>
-  </p:clrMapOvr>
-  <p:timing>
-    <p:tnLst>
-      <p:par>
-        <p:cTn id="1" dur="indefinite" restart="never" nodeType="tmRoot"/>
-      </p:par>
-    </p:tnLst>
-  </p:timing>
-</p:sld>
-</file>
-
-<file path=ppt/slides/slide6.xml><?xml version="1.0" encoding="utf-8"?>
-<p:sld xmlns:a="http://schemas.openxmlformats.org/drawingml/2006/main" xmlns:r="http://schemas.openxmlformats.org/officeDocument/2006/relationships" xmlns:p="http://schemas.openxmlformats.org/presentationml/2006/main">
-  <p:cSld>
-    <p:spTree>
-      <p:nvGrpSpPr>
-        <p:cNvPr id="1" name=""/>
-        <p:cNvGrpSpPr/>
-        <p:nvPr/>
-      </p:nvGrpSpPr>
-      <p:grpSpPr>
-        <a:xfrm>
-          <a:off x="0" y="0"/>
-          <a:ext cx="0" cy="0"/>
-          <a:chOff x="0" y="0"/>
-          <a:chExt cx="0" cy="0"/>
-        </a:xfrm>
-      </p:grpSpPr>
-      <p:sp>
-        <p:nvSpPr>
-          <p:cNvPr id="2" name="Title 1"/>
-          <p:cNvSpPr>
-            <a:spLocks noGrp="1"/>
-          </p:cNvSpPr>
-          <p:nvPr>
-            <p:ph type="title"/>
-          </p:nvPr>
-        </p:nvSpPr>
-        <p:spPr>
-          <a:xfrm>
-            <a:off x="2555776" y="116632"/>
-            <a:ext cx="8229600" cy="1143000"/>
-          </a:xfrm>
-        </p:spPr>
-        <p:txBody>
-          <a:bodyPr/>
-          <a:lstStyle/>
-          <a:p>
-            <a:pPr algn="ctr"/>
-            <a:r>
-              <a:rPr lang="sv-SE" dirty="0" smtClean="0"/>
-              <a:t>Bluetooth </a:t>
-            </a:r>
-            <a:endParaRPr lang="sv-SE" dirty="0"/>
-          </a:p>
-        </p:txBody>
-      </p:sp>
-      <p:pic>
-        <p:nvPicPr>
-          <p:cNvPr id="5" name="Content Placeholder 4"/>
-          <p:cNvPicPr>
-            <a:picLocks noGrp="1" noChangeAspect="1"/>
-          </p:cNvPicPr>
-          <p:nvPr>
-            <p:ph sz="half" idx="1"/>
-          </p:nvPr>
-        </p:nvPicPr>
-        <p:blipFill>
-          <a:blip r:embed="rId2" cstate="print">
-            <a:extLst>
-              <a:ext uri="{28A0092B-C50C-407E-A947-70E740481C1C}">
-                <a14:useLocalDpi xmlns:a14="http://schemas.microsoft.com/office/drawing/2010/main" val="0"/>
-              </a:ext>
-            </a:extLst>
-          </a:blip>
-          <a:stretch>
-            <a:fillRect/>
-          </a:stretch>
-        </p:blipFill>
-        <p:spPr>
-          <a:xfrm>
-            <a:off x="179512" y="188640"/>
-            <a:ext cx="3384000" cy="6016000"/>
-          </a:xfrm>
-        </p:spPr>
-      </p:pic>
       <p:sp>
         <p:nvSpPr>
           <p:cNvPr id="4" name="Content Placeholder 3"/>
@@ -4729,7 +4270,7 @@
         </p:nvSpPr>
         <p:spPr>
           <a:xfrm rot="20844474">
-            <a:off x="1651891" y="2392889"/>
+            <a:off x="1867914" y="2600939"/>
             <a:ext cx="3116409" cy="1299996"/>
           </a:xfrm>
           <a:prstGeom prst="leftArrow">
@@ -4966,6 +4507,1537 @@
 </p:sld>
 </file>
 
+<file path=ppt/slides/slide11.xml><?xml version="1.0" encoding="utf-8"?>
+<p:sld xmlns:a="http://schemas.openxmlformats.org/drawingml/2006/main" xmlns:r="http://schemas.openxmlformats.org/officeDocument/2006/relationships" xmlns:p="http://schemas.openxmlformats.org/presentationml/2006/main">
+  <p:cSld>
+    <p:spTree>
+      <p:nvGrpSpPr>
+        <p:cNvPr id="1" name=""/>
+        <p:cNvGrpSpPr/>
+        <p:nvPr/>
+      </p:nvGrpSpPr>
+      <p:grpSpPr>
+        <a:xfrm>
+          <a:off x="0" y="0"/>
+          <a:ext cx="0" cy="0"/>
+          <a:chOff x="0" y="0"/>
+          <a:chExt cx="0" cy="0"/>
+        </a:xfrm>
+      </p:grpSpPr>
+      <p:pic>
+        <p:nvPicPr>
+          <p:cNvPr id="5" name="Content Placeholder 4"/>
+          <p:cNvPicPr>
+            <a:picLocks noGrp="1" noChangeAspect="1"/>
+          </p:cNvPicPr>
+          <p:nvPr>
+            <p:ph sz="half" idx="1"/>
+          </p:nvPr>
+        </p:nvPicPr>
+        <p:blipFill>
+          <a:blip r:embed="rId2" cstate="print">
+            <a:extLst>
+              <a:ext uri="{28A0092B-C50C-407E-A947-70E740481C1C}">
+                <a14:useLocalDpi xmlns:a14="http://schemas.microsoft.com/office/drawing/2010/main" val="0"/>
+              </a:ext>
+            </a:extLst>
+          </a:blip>
+          <a:stretch>
+            <a:fillRect/>
+          </a:stretch>
+        </p:blipFill>
+        <p:spPr>
+          <a:xfrm>
+            <a:off x="4863" y="18056"/>
+            <a:ext cx="3847469" cy="6839944"/>
+          </a:xfrm>
+        </p:spPr>
+      </p:pic>
+      <p:sp>
+        <p:nvSpPr>
+          <p:cNvPr id="4" name="Content Placeholder 3"/>
+          <p:cNvSpPr>
+            <a:spLocks noGrp="1"/>
+          </p:cNvSpPr>
+          <p:nvPr>
+            <p:ph sz="half" idx="2"/>
+          </p:nvPr>
+        </p:nvSpPr>
+        <p:spPr/>
+        <p:txBody>
+          <a:bodyPr>
+            <a:normAutofit/>
+          </a:bodyPr>
+          <a:lstStyle/>
+          <a:p>
+            <a:r>
+              <a:rPr lang="sv-SE" sz="4400" dirty="0" smtClean="0"/>
+              <a:t>Main menu</a:t>
+            </a:r>
+            <a:endParaRPr lang="sv-SE" sz="4400" dirty="0"/>
+          </a:p>
+        </p:txBody>
+      </p:sp>
+      <p:sp>
+        <p:nvSpPr>
+          <p:cNvPr id="9" name="Title 1"/>
+          <p:cNvSpPr>
+            <a:spLocks noGrp="1"/>
+          </p:cNvSpPr>
+          <p:nvPr>
+            <p:ph type="title"/>
+          </p:nvPr>
+        </p:nvSpPr>
+        <p:spPr>
+          <a:xfrm>
+            <a:off x="2483768" y="332656"/>
+            <a:ext cx="8229600" cy="1143000"/>
+          </a:xfrm>
+        </p:spPr>
+        <p:txBody>
+          <a:bodyPr>
+            <a:normAutofit/>
+          </a:bodyPr>
+          <a:lstStyle/>
+          <a:p>
+            <a:pPr algn="ctr"/>
+            <a:r>
+              <a:rPr lang="sv-SE" sz="5500" dirty="0" smtClean="0"/>
+              <a:t>SQlite Database </a:t>
+            </a:r>
+            <a:endParaRPr lang="sv-SE" sz="5500" dirty="0"/>
+          </a:p>
+        </p:txBody>
+      </p:sp>
+    </p:spTree>
+    <p:extLst>
+      <p:ext uri="{BB962C8B-B14F-4D97-AF65-F5344CB8AC3E}">
+        <p14:creationId xmlns:p14="http://schemas.microsoft.com/office/powerpoint/2010/main" val="2988285507"/>
+      </p:ext>
+    </p:extLst>
+  </p:cSld>
+  <p:clrMapOvr>
+    <a:masterClrMapping/>
+  </p:clrMapOvr>
+  <p:timing>
+    <p:tnLst>
+      <p:par>
+        <p:cTn id="1" dur="indefinite" restart="never" nodeType="tmRoot"/>
+      </p:par>
+    </p:tnLst>
+  </p:timing>
+</p:sld>
+</file>
+
+<file path=ppt/slides/slide12.xml><?xml version="1.0" encoding="utf-8"?>
+<p:sld xmlns:a="http://schemas.openxmlformats.org/drawingml/2006/main" xmlns:r="http://schemas.openxmlformats.org/officeDocument/2006/relationships" xmlns:p="http://schemas.openxmlformats.org/presentationml/2006/main">
+  <p:cSld>
+    <p:spTree>
+      <p:nvGrpSpPr>
+        <p:cNvPr id="1" name=""/>
+        <p:cNvGrpSpPr/>
+        <p:nvPr/>
+      </p:nvGrpSpPr>
+      <p:grpSpPr>
+        <a:xfrm>
+          <a:off x="0" y="0"/>
+          <a:ext cx="0" cy="0"/>
+          <a:chOff x="0" y="0"/>
+          <a:chExt cx="0" cy="0"/>
+        </a:xfrm>
+      </p:grpSpPr>
+      <p:sp>
+        <p:nvSpPr>
+          <p:cNvPr id="2" name="Title 1"/>
+          <p:cNvSpPr>
+            <a:spLocks noGrp="1"/>
+          </p:cNvSpPr>
+          <p:nvPr>
+            <p:ph type="title"/>
+          </p:nvPr>
+        </p:nvSpPr>
+        <p:spPr>
+          <a:xfrm>
+            <a:off x="2339752" y="260648"/>
+            <a:ext cx="8229600" cy="1143000"/>
+          </a:xfrm>
+        </p:spPr>
+        <p:txBody>
+          <a:bodyPr>
+            <a:normAutofit/>
+          </a:bodyPr>
+          <a:lstStyle/>
+          <a:p>
+            <a:pPr algn="ctr"/>
+            <a:r>
+              <a:rPr lang="sv-SE" sz="5500" dirty="0" smtClean="0"/>
+              <a:t>SQlite Database </a:t>
+            </a:r>
+            <a:endParaRPr lang="sv-SE" sz="5500" dirty="0"/>
+          </a:p>
+        </p:txBody>
+      </p:sp>
+      <p:pic>
+        <p:nvPicPr>
+          <p:cNvPr id="5" name="Content Placeholder 4"/>
+          <p:cNvPicPr>
+            <a:picLocks noGrp="1" noChangeAspect="1"/>
+          </p:cNvPicPr>
+          <p:nvPr>
+            <p:ph sz="half" idx="1"/>
+          </p:nvPr>
+        </p:nvPicPr>
+        <p:blipFill>
+          <a:blip r:embed="rId2" cstate="print">
+            <a:extLst>
+              <a:ext uri="{28A0092B-C50C-407E-A947-70E740481C1C}">
+                <a14:useLocalDpi xmlns:a14="http://schemas.microsoft.com/office/drawing/2010/main" val="0"/>
+              </a:ext>
+            </a:extLst>
+          </a:blip>
+          <a:stretch>
+            <a:fillRect/>
+          </a:stretch>
+        </p:blipFill>
+        <p:spPr>
+          <a:xfrm>
+            <a:off x="-1" y="0"/>
+            <a:ext cx="3857625" cy="6858000"/>
+          </a:xfrm>
+        </p:spPr>
+      </p:pic>
+      <p:sp>
+        <p:nvSpPr>
+          <p:cNvPr id="4" name="Content Placeholder 3"/>
+          <p:cNvSpPr>
+            <a:spLocks noGrp="1"/>
+          </p:cNvSpPr>
+          <p:nvPr>
+            <p:ph sz="half" idx="2"/>
+          </p:nvPr>
+        </p:nvSpPr>
+        <p:spPr>
+          <a:xfrm>
+            <a:off x="4355976" y="2060848"/>
+            <a:ext cx="4038600" cy="4434840"/>
+          </a:xfrm>
+        </p:spPr>
+        <p:txBody>
+          <a:bodyPr/>
+          <a:lstStyle/>
+          <a:p>
+            <a:r>
+              <a:rPr lang="sv-SE" sz="3500" dirty="0" smtClean="0"/>
+              <a:t>Command history</a:t>
+            </a:r>
+          </a:p>
+          <a:p>
+            <a:endParaRPr lang="sv-SE" dirty="0" smtClean="0"/>
+          </a:p>
+        </p:txBody>
+      </p:sp>
+    </p:spTree>
+    <p:extLst>
+      <p:ext uri="{BB962C8B-B14F-4D97-AF65-F5344CB8AC3E}">
+        <p14:creationId xmlns:p14="http://schemas.microsoft.com/office/powerpoint/2010/main" val="2777704850"/>
+      </p:ext>
+    </p:extLst>
+  </p:cSld>
+  <p:clrMapOvr>
+    <a:masterClrMapping/>
+  </p:clrMapOvr>
+  <p:timing>
+    <p:tnLst>
+      <p:par>
+        <p:cTn id="1" dur="indefinite" restart="never" nodeType="tmRoot"/>
+      </p:par>
+    </p:tnLst>
+  </p:timing>
+</p:sld>
+</file>
+
+<file path=ppt/slides/slide13.xml><?xml version="1.0" encoding="utf-8"?>
+<p:sld xmlns:a="http://schemas.openxmlformats.org/drawingml/2006/main" xmlns:r="http://schemas.openxmlformats.org/officeDocument/2006/relationships" xmlns:p="http://schemas.openxmlformats.org/presentationml/2006/main">
+  <p:cSld>
+    <p:spTree>
+      <p:nvGrpSpPr>
+        <p:cNvPr id="1" name=""/>
+        <p:cNvGrpSpPr/>
+        <p:nvPr/>
+      </p:nvGrpSpPr>
+      <p:grpSpPr>
+        <a:xfrm>
+          <a:off x="0" y="0"/>
+          <a:ext cx="0" cy="0"/>
+          <a:chOff x="0" y="0"/>
+          <a:chExt cx="0" cy="0"/>
+        </a:xfrm>
+      </p:grpSpPr>
+      <p:sp>
+        <p:nvSpPr>
+          <p:cNvPr id="2" name="Title 1"/>
+          <p:cNvSpPr>
+            <a:spLocks noGrp="1"/>
+          </p:cNvSpPr>
+          <p:nvPr>
+            <p:ph type="title"/>
+          </p:nvPr>
+        </p:nvSpPr>
+        <p:spPr>
+          <a:xfrm>
+            <a:off x="251520" y="188640"/>
+            <a:ext cx="8229600" cy="1143000"/>
+          </a:xfrm>
+        </p:spPr>
+        <p:txBody>
+          <a:bodyPr>
+            <a:normAutofit/>
+          </a:bodyPr>
+          <a:lstStyle/>
+          <a:p>
+            <a:pPr algn="ctr"/>
+            <a:r>
+              <a:rPr lang="sv-SE" sz="5500" dirty="0" smtClean="0"/>
+              <a:t>Arduino</a:t>
+            </a:r>
+            <a:endParaRPr lang="sv-SE" sz="5500" dirty="0"/>
+          </a:p>
+        </p:txBody>
+      </p:sp>
+      <p:sp>
+        <p:nvSpPr>
+          <p:cNvPr id="4" name="Content Placeholder 3"/>
+          <p:cNvSpPr>
+            <a:spLocks noGrp="1"/>
+          </p:cNvSpPr>
+          <p:nvPr>
+            <p:ph sz="half" idx="2"/>
+          </p:nvPr>
+        </p:nvSpPr>
+        <p:spPr>
+          <a:xfrm>
+            <a:off x="2699792" y="1268760"/>
+            <a:ext cx="5544616" cy="4248472"/>
+          </a:xfrm>
+        </p:spPr>
+        <p:txBody>
+          <a:bodyPr>
+            <a:normAutofit/>
+          </a:bodyPr>
+          <a:lstStyle/>
+          <a:p>
+            <a:r>
+              <a:rPr lang="sv-SE" sz="4400" dirty="0" smtClean="0"/>
+              <a:t>Connection</a:t>
+            </a:r>
+          </a:p>
+          <a:p>
+            <a:r>
+              <a:rPr lang="sv-SE" sz="4400" dirty="0" smtClean="0"/>
+              <a:t>Arduino playground</a:t>
+            </a:r>
+            <a:endParaRPr lang="sv-SE" sz="4400" dirty="0"/>
+          </a:p>
+        </p:txBody>
+      </p:sp>
+      <p:pic>
+        <p:nvPicPr>
+          <p:cNvPr id="5" name="Content Placeholder 4"/>
+          <p:cNvPicPr>
+            <a:picLocks noGrp="1" noChangeAspect="1"/>
+          </p:cNvPicPr>
+          <p:nvPr>
+            <p:ph sz="half" idx="1"/>
+          </p:nvPr>
+        </p:nvPicPr>
+        <p:blipFill>
+          <a:blip r:embed="rId2" cstate="print">
+            <a:extLst>
+              <a:ext uri="{28A0092B-C50C-407E-A947-70E740481C1C}">
+                <a14:useLocalDpi xmlns:a14="http://schemas.microsoft.com/office/drawing/2010/main" val="0"/>
+              </a:ext>
+            </a:extLst>
+          </a:blip>
+          <a:stretch>
+            <a:fillRect/>
+          </a:stretch>
+        </p:blipFill>
+        <p:spPr>
+          <a:xfrm>
+            <a:off x="1115616" y="3166833"/>
+            <a:ext cx="7150376" cy="3672408"/>
+          </a:xfrm>
+        </p:spPr>
+      </p:pic>
+    </p:spTree>
+    <p:extLst>
+      <p:ext uri="{BB962C8B-B14F-4D97-AF65-F5344CB8AC3E}">
+        <p14:creationId xmlns:p14="http://schemas.microsoft.com/office/powerpoint/2010/main" val="2664708121"/>
+      </p:ext>
+    </p:extLst>
+  </p:cSld>
+  <p:clrMapOvr>
+    <a:masterClrMapping/>
+  </p:clrMapOvr>
+  <p:timing>
+    <p:tnLst>
+      <p:par>
+        <p:cTn id="1" dur="indefinite" restart="never" nodeType="tmRoot"/>
+      </p:par>
+    </p:tnLst>
+  </p:timing>
+</p:sld>
+</file>
+
+<file path=ppt/slides/slide14.xml><?xml version="1.0" encoding="utf-8"?>
+<p:sld xmlns:a="http://schemas.openxmlformats.org/drawingml/2006/main" xmlns:r="http://schemas.openxmlformats.org/officeDocument/2006/relationships" xmlns:p="http://schemas.openxmlformats.org/presentationml/2006/main">
+  <p:cSld>
+    <p:spTree>
+      <p:nvGrpSpPr>
+        <p:cNvPr id="1" name=""/>
+        <p:cNvGrpSpPr/>
+        <p:nvPr/>
+      </p:nvGrpSpPr>
+      <p:grpSpPr>
+        <a:xfrm>
+          <a:off x="0" y="0"/>
+          <a:ext cx="0" cy="0"/>
+          <a:chOff x="0" y="0"/>
+          <a:chExt cx="0" cy="0"/>
+        </a:xfrm>
+      </p:grpSpPr>
+      <p:sp>
+        <p:nvSpPr>
+          <p:cNvPr id="2" name="Title 1"/>
+          <p:cNvSpPr>
+            <a:spLocks noGrp="1"/>
+          </p:cNvSpPr>
+          <p:nvPr>
+            <p:ph type="title"/>
+          </p:nvPr>
+        </p:nvSpPr>
+        <p:spPr/>
+        <p:txBody>
+          <a:bodyPr/>
+          <a:lstStyle/>
+          <a:p>
+            <a:pPr algn="ctr"/>
+            <a:r>
+              <a:rPr lang="sv-SE" dirty="0" smtClean="0"/>
+              <a:t>Results from this project</a:t>
+            </a:r>
+            <a:endParaRPr lang="sv-SE" dirty="0"/>
+          </a:p>
+        </p:txBody>
+      </p:sp>
+      <p:sp>
+        <p:nvSpPr>
+          <p:cNvPr id="3" name="Content Placeholder 2"/>
+          <p:cNvSpPr>
+            <a:spLocks noGrp="1"/>
+          </p:cNvSpPr>
+          <p:nvPr>
+            <p:ph sz="half" idx="1"/>
+          </p:nvPr>
+        </p:nvSpPr>
+        <p:spPr>
+          <a:xfrm>
+            <a:off x="457200" y="1920085"/>
+            <a:ext cx="8003232" cy="4434840"/>
+          </a:xfrm>
+        </p:spPr>
+        <p:txBody>
+          <a:bodyPr>
+            <a:noAutofit/>
+          </a:bodyPr>
+          <a:lstStyle/>
+          <a:p>
+            <a:r>
+              <a:rPr lang="sv-SE" sz="2700" dirty="0" smtClean="0"/>
+              <a:t>The expected results</a:t>
+            </a:r>
+          </a:p>
+          <a:p>
+            <a:r>
+              <a:rPr lang="sv-SE" sz="2700" dirty="0" smtClean="0"/>
+              <a:t>The actuall results</a:t>
+            </a:r>
+          </a:p>
+          <a:p>
+            <a:r>
+              <a:rPr lang="sv-SE" sz="2700" dirty="0" smtClean="0"/>
+              <a:t>How did we get there?</a:t>
+            </a:r>
+          </a:p>
+          <a:p>
+            <a:pPr lvl="1"/>
+            <a:r>
+              <a:rPr lang="sv-SE" sz="2700" dirty="0" smtClean="0"/>
+              <a:t>XP</a:t>
+            </a:r>
+          </a:p>
+          <a:p>
+            <a:pPr lvl="1"/>
+            <a:r>
+              <a:rPr lang="sv-SE" sz="2700" dirty="0" smtClean="0"/>
+              <a:t>Black box – White box</a:t>
+            </a:r>
+          </a:p>
+          <a:p>
+            <a:pPr lvl="1"/>
+            <a:r>
+              <a:rPr lang="sv-SE" sz="2700" dirty="0" smtClean="0"/>
+              <a:t>GitHub</a:t>
+            </a:r>
+          </a:p>
+          <a:p>
+            <a:pPr lvl="1"/>
+            <a:r>
+              <a:rPr lang="sv-SE" sz="2700" dirty="0" smtClean="0"/>
+              <a:t>Problems on the way</a:t>
+            </a:r>
+          </a:p>
+          <a:p>
+            <a:pPr lvl="1"/>
+            <a:r>
+              <a:rPr lang="sv-SE" sz="2700" dirty="0" smtClean="0"/>
+              <a:t>How did we solve the probelms</a:t>
+            </a:r>
+            <a:endParaRPr lang="sv-SE" sz="2700" dirty="0"/>
+          </a:p>
+          <a:p>
+            <a:pPr marL="484632" indent="-457200"/>
+            <a:r>
+              <a:rPr lang="sv-SE" sz="2700" dirty="0" smtClean="0"/>
+              <a:t>Velocity</a:t>
+            </a:r>
+          </a:p>
+        </p:txBody>
+      </p:sp>
+    </p:spTree>
+    <p:extLst>
+      <p:ext uri="{BB962C8B-B14F-4D97-AF65-F5344CB8AC3E}">
+        <p14:creationId xmlns:p14="http://schemas.microsoft.com/office/powerpoint/2010/main" val="3481001751"/>
+      </p:ext>
+    </p:extLst>
+  </p:cSld>
+  <p:clrMapOvr>
+    <a:masterClrMapping/>
+  </p:clrMapOvr>
+  <p:timing>
+    <p:tnLst>
+      <p:par>
+        <p:cTn id="1" dur="indefinite" restart="never" nodeType="tmRoot"/>
+      </p:par>
+    </p:tnLst>
+  </p:timing>
+</p:sld>
+</file>
+
+<file path=ppt/slides/slide15.xml><?xml version="1.0" encoding="utf-8"?>
+<p:sld xmlns:a="http://schemas.openxmlformats.org/drawingml/2006/main" xmlns:r="http://schemas.openxmlformats.org/officeDocument/2006/relationships" xmlns:p="http://schemas.openxmlformats.org/presentationml/2006/main">
+  <p:cSld>
+    <p:spTree>
+      <p:nvGrpSpPr>
+        <p:cNvPr id="1" name=""/>
+        <p:cNvGrpSpPr/>
+        <p:nvPr/>
+      </p:nvGrpSpPr>
+      <p:grpSpPr>
+        <a:xfrm>
+          <a:off x="0" y="0"/>
+          <a:ext cx="0" cy="0"/>
+          <a:chOff x="0" y="0"/>
+          <a:chExt cx="0" cy="0"/>
+        </a:xfrm>
+      </p:grpSpPr>
+      <p:sp>
+        <p:nvSpPr>
+          <p:cNvPr id="2" name="Title 1"/>
+          <p:cNvSpPr>
+            <a:spLocks noGrp="1"/>
+          </p:cNvSpPr>
+          <p:nvPr>
+            <p:ph type="title"/>
+          </p:nvPr>
+        </p:nvSpPr>
+        <p:spPr/>
+        <p:txBody>
+          <a:bodyPr/>
+          <a:lstStyle/>
+          <a:p>
+            <a:pPr algn="ctr"/>
+            <a:r>
+              <a:rPr lang="sv-SE" dirty="0" smtClean="0"/>
+              <a:t>Results</a:t>
+            </a:r>
+            <a:endParaRPr lang="sv-SE" dirty="0"/>
+          </a:p>
+        </p:txBody>
+      </p:sp>
+      <p:sp>
+        <p:nvSpPr>
+          <p:cNvPr id="3" name="Content Placeholder 2"/>
+          <p:cNvSpPr>
+            <a:spLocks noGrp="1"/>
+          </p:cNvSpPr>
+          <p:nvPr>
+            <p:ph sz="half" idx="1"/>
+          </p:nvPr>
+        </p:nvSpPr>
+        <p:spPr>
+          <a:xfrm>
+            <a:off x="323528" y="3068960"/>
+            <a:ext cx="8282880" cy="4434840"/>
+          </a:xfrm>
+        </p:spPr>
+        <p:txBody>
+          <a:bodyPr>
+            <a:normAutofit/>
+          </a:bodyPr>
+          <a:lstStyle/>
+          <a:p>
+            <a:pPr algn="ctr"/>
+            <a:r>
+              <a:rPr lang="sv-SE" sz="8000" dirty="0" smtClean="0"/>
+              <a:t>Movie time!</a:t>
+            </a:r>
+            <a:endParaRPr lang="sv-SE" sz="8000" dirty="0"/>
+          </a:p>
+        </p:txBody>
+      </p:sp>
+    </p:spTree>
+    <p:extLst>
+      <p:ext uri="{BB962C8B-B14F-4D97-AF65-F5344CB8AC3E}">
+        <p14:creationId xmlns:p14="http://schemas.microsoft.com/office/powerpoint/2010/main" val="1609141393"/>
+      </p:ext>
+    </p:extLst>
+  </p:cSld>
+  <p:clrMapOvr>
+    <a:masterClrMapping/>
+  </p:clrMapOvr>
+  <p:timing>
+    <p:tnLst>
+      <p:par>
+        <p:cTn id="1" dur="indefinite" restart="never" nodeType="tmRoot"/>
+      </p:par>
+    </p:tnLst>
+  </p:timing>
+</p:sld>
+</file>
+
+<file path=ppt/slides/slide16.xml><?xml version="1.0" encoding="utf-8"?>
+<p:sld xmlns:a="http://schemas.openxmlformats.org/drawingml/2006/main" xmlns:r="http://schemas.openxmlformats.org/officeDocument/2006/relationships" xmlns:p="http://schemas.openxmlformats.org/presentationml/2006/main">
+  <p:cSld>
+    <p:spTree>
+      <p:nvGrpSpPr>
+        <p:cNvPr id="1" name=""/>
+        <p:cNvGrpSpPr/>
+        <p:nvPr/>
+      </p:nvGrpSpPr>
+      <p:grpSpPr>
+        <a:xfrm>
+          <a:off x="0" y="0"/>
+          <a:ext cx="0" cy="0"/>
+          <a:chOff x="0" y="0"/>
+          <a:chExt cx="0" cy="0"/>
+        </a:xfrm>
+      </p:grpSpPr>
+      <p:sp>
+        <p:nvSpPr>
+          <p:cNvPr id="2" name="Title 1"/>
+          <p:cNvSpPr>
+            <a:spLocks noGrp="1"/>
+          </p:cNvSpPr>
+          <p:nvPr>
+            <p:ph type="title"/>
+          </p:nvPr>
+        </p:nvSpPr>
+        <p:spPr/>
+        <p:txBody>
+          <a:bodyPr/>
+          <a:lstStyle/>
+          <a:p>
+            <a:pPr algn="ctr"/>
+            <a:r>
+              <a:rPr lang="sv-SE" dirty="0"/>
+              <a:t>C</a:t>
+            </a:r>
+            <a:r>
+              <a:rPr lang="sv-SE" dirty="0" smtClean="0"/>
+              <a:t>onclusion</a:t>
+            </a:r>
+            <a:endParaRPr lang="sv-SE" dirty="0"/>
+          </a:p>
+        </p:txBody>
+      </p:sp>
+      <p:sp>
+        <p:nvSpPr>
+          <p:cNvPr id="3" name="Content Placeholder 2"/>
+          <p:cNvSpPr>
+            <a:spLocks noGrp="1"/>
+          </p:cNvSpPr>
+          <p:nvPr>
+            <p:ph sz="half" idx="1"/>
+          </p:nvPr>
+        </p:nvSpPr>
+        <p:spPr>
+          <a:xfrm>
+            <a:off x="457200" y="1920085"/>
+            <a:ext cx="8147248" cy="4434840"/>
+          </a:xfrm>
+        </p:spPr>
+        <p:txBody>
+          <a:bodyPr>
+            <a:normAutofit lnSpcReduction="10000"/>
+          </a:bodyPr>
+          <a:lstStyle/>
+          <a:p>
+            <a:r>
+              <a:rPr lang="sv-SE" sz="4400" dirty="0" smtClean="0"/>
+              <a:t>Can we improve quality of normal life?</a:t>
+            </a:r>
+          </a:p>
+          <a:p>
+            <a:r>
+              <a:rPr lang="sv-SE" sz="4400" dirty="0" smtClean="0"/>
+              <a:t>How? Where?</a:t>
+            </a:r>
+          </a:p>
+          <a:p>
+            <a:r>
+              <a:rPr lang="sv-SE" sz="4400" dirty="0" smtClean="0"/>
+              <a:t>Is voice recognition a reliable input?</a:t>
+            </a:r>
+          </a:p>
+          <a:p>
+            <a:r>
+              <a:rPr lang="sv-SE" sz="4400" dirty="0" smtClean="0"/>
+              <a:t>Why?</a:t>
+            </a:r>
+          </a:p>
+          <a:p>
+            <a:endParaRPr lang="sv-SE" dirty="0"/>
+          </a:p>
+        </p:txBody>
+      </p:sp>
+    </p:spTree>
+    <p:extLst>
+      <p:ext uri="{BB962C8B-B14F-4D97-AF65-F5344CB8AC3E}">
+        <p14:creationId xmlns:p14="http://schemas.microsoft.com/office/powerpoint/2010/main" val="4023734369"/>
+      </p:ext>
+    </p:extLst>
+  </p:cSld>
+  <p:clrMapOvr>
+    <a:masterClrMapping/>
+  </p:clrMapOvr>
+  <p:timing>
+    <p:tnLst>
+      <p:par>
+        <p:cTn id="1" dur="indefinite" restart="never" nodeType="tmRoot"/>
+      </p:par>
+    </p:tnLst>
+  </p:timing>
+</p:sld>
+</file>
+
+<file path=ppt/slides/slide17.xml><?xml version="1.0" encoding="utf-8"?>
+<p:sld xmlns:a="http://schemas.openxmlformats.org/drawingml/2006/main" xmlns:r="http://schemas.openxmlformats.org/officeDocument/2006/relationships" xmlns:p="http://schemas.openxmlformats.org/presentationml/2006/main">
+  <p:cSld>
+    <p:spTree>
+      <p:nvGrpSpPr>
+        <p:cNvPr id="1" name=""/>
+        <p:cNvGrpSpPr/>
+        <p:nvPr/>
+      </p:nvGrpSpPr>
+      <p:grpSpPr>
+        <a:xfrm>
+          <a:off x="0" y="0"/>
+          <a:ext cx="0" cy="0"/>
+          <a:chOff x="0" y="0"/>
+          <a:chExt cx="0" cy="0"/>
+        </a:xfrm>
+      </p:grpSpPr>
+      <p:sp>
+        <p:nvSpPr>
+          <p:cNvPr id="2" name="Title 1"/>
+          <p:cNvSpPr>
+            <a:spLocks noGrp="1"/>
+          </p:cNvSpPr>
+          <p:nvPr>
+            <p:ph type="title"/>
+          </p:nvPr>
+        </p:nvSpPr>
+        <p:spPr/>
+        <p:txBody>
+          <a:bodyPr/>
+          <a:lstStyle/>
+          <a:p>
+            <a:pPr algn="ctr"/>
+            <a:r>
+              <a:rPr lang="sv-SE" dirty="0" smtClean="0"/>
+              <a:t>Further work</a:t>
+            </a:r>
+            <a:endParaRPr lang="sv-SE" dirty="0"/>
+          </a:p>
+        </p:txBody>
+      </p:sp>
+      <p:sp>
+        <p:nvSpPr>
+          <p:cNvPr id="3" name="Content Placeholder 2"/>
+          <p:cNvSpPr>
+            <a:spLocks noGrp="1"/>
+          </p:cNvSpPr>
+          <p:nvPr>
+            <p:ph sz="half" idx="1"/>
+          </p:nvPr>
+        </p:nvSpPr>
+        <p:spPr>
+          <a:xfrm>
+            <a:off x="457200" y="1920085"/>
+            <a:ext cx="8147248" cy="4434840"/>
+          </a:xfrm>
+        </p:spPr>
+        <p:txBody>
+          <a:bodyPr/>
+          <a:lstStyle/>
+          <a:p>
+            <a:r>
+              <a:rPr lang="sv-SE" sz="4400" dirty="0" smtClean="0"/>
+              <a:t>More functions</a:t>
+            </a:r>
+          </a:p>
+          <a:p>
+            <a:r>
+              <a:rPr lang="sv-SE" sz="4400" dirty="0" smtClean="0"/>
+              <a:t>Advanced hardware</a:t>
+            </a:r>
+          </a:p>
+          <a:p>
+            <a:r>
+              <a:rPr lang="sv-SE" sz="4400" dirty="0" smtClean="0"/>
+              <a:t>Implementation in real life</a:t>
+            </a:r>
+          </a:p>
+          <a:p>
+            <a:r>
+              <a:rPr lang="sv-SE" sz="4400" dirty="0" smtClean="0"/>
+              <a:t>Why did we not do it?</a:t>
+            </a:r>
+          </a:p>
+          <a:p>
+            <a:endParaRPr lang="sv-SE" dirty="0"/>
+          </a:p>
+        </p:txBody>
+      </p:sp>
+    </p:spTree>
+    <p:extLst>
+      <p:ext uri="{BB962C8B-B14F-4D97-AF65-F5344CB8AC3E}">
+        <p14:creationId xmlns:p14="http://schemas.microsoft.com/office/powerpoint/2010/main" val="2459274982"/>
+      </p:ext>
+    </p:extLst>
+  </p:cSld>
+  <p:clrMapOvr>
+    <a:masterClrMapping/>
+  </p:clrMapOvr>
+  <p:timing>
+    <p:tnLst>
+      <p:par>
+        <p:cTn id="1" dur="indefinite" restart="never" nodeType="tmRoot"/>
+      </p:par>
+    </p:tnLst>
+  </p:timing>
+</p:sld>
+</file>
+
+<file path=ppt/slides/slide18.xml><?xml version="1.0" encoding="utf-8"?>
+<p:sld xmlns:a="http://schemas.openxmlformats.org/drawingml/2006/main" xmlns:r="http://schemas.openxmlformats.org/officeDocument/2006/relationships" xmlns:p="http://schemas.openxmlformats.org/presentationml/2006/main">
+  <p:cSld>
+    <p:spTree>
+      <p:nvGrpSpPr>
+        <p:cNvPr id="1" name=""/>
+        <p:cNvGrpSpPr/>
+        <p:nvPr/>
+      </p:nvGrpSpPr>
+      <p:grpSpPr>
+        <a:xfrm>
+          <a:off x="0" y="0"/>
+          <a:ext cx="0" cy="0"/>
+          <a:chOff x="0" y="0"/>
+          <a:chExt cx="0" cy="0"/>
+        </a:xfrm>
+      </p:grpSpPr>
+      <p:sp>
+        <p:nvSpPr>
+          <p:cNvPr id="2" name="Title 1"/>
+          <p:cNvSpPr>
+            <a:spLocks noGrp="1"/>
+          </p:cNvSpPr>
+          <p:nvPr>
+            <p:ph type="title"/>
+          </p:nvPr>
+        </p:nvSpPr>
+        <p:spPr/>
+        <p:txBody>
+          <a:bodyPr/>
+          <a:lstStyle/>
+          <a:p>
+            <a:pPr algn="ctr"/>
+            <a:r>
+              <a:rPr lang="sv-SE" dirty="0" smtClean="0"/>
+              <a:t>Thanks for listening!</a:t>
+            </a:r>
+            <a:endParaRPr lang="sv-SE" dirty="0"/>
+          </a:p>
+        </p:txBody>
+      </p:sp>
+      <p:pic>
+        <p:nvPicPr>
+          <p:cNvPr id="5" name="Picture 4"/>
+          <p:cNvPicPr>
+            <a:picLocks noChangeAspect="1"/>
+          </p:cNvPicPr>
+          <p:nvPr/>
+        </p:nvPicPr>
+        <p:blipFill>
+          <a:blip r:embed="rId2" cstate="print">
+            <a:extLst>
+              <a:ext uri="{28A0092B-C50C-407E-A947-70E740481C1C}">
+                <a14:useLocalDpi xmlns:a14="http://schemas.microsoft.com/office/drawing/2010/main" val="0"/>
+              </a:ext>
+            </a:extLst>
+          </a:blip>
+          <a:stretch>
+            <a:fillRect/>
+          </a:stretch>
+        </p:blipFill>
+        <p:spPr>
+          <a:xfrm>
+            <a:off x="3059832" y="1916832"/>
+            <a:ext cx="2779407" cy="4941168"/>
+          </a:xfrm>
+          <a:prstGeom prst="rect">
+            <a:avLst/>
+          </a:prstGeom>
+        </p:spPr>
+      </p:pic>
+    </p:spTree>
+    <p:extLst>
+      <p:ext uri="{BB962C8B-B14F-4D97-AF65-F5344CB8AC3E}">
+        <p14:creationId xmlns:p14="http://schemas.microsoft.com/office/powerpoint/2010/main" val="2592561486"/>
+      </p:ext>
+    </p:extLst>
+  </p:cSld>
+  <p:clrMapOvr>
+    <a:masterClrMapping/>
+  </p:clrMapOvr>
+  <p:timing>
+    <p:tnLst>
+      <p:par>
+        <p:cTn id="1" dur="indefinite" restart="never" nodeType="tmRoot"/>
+      </p:par>
+    </p:tnLst>
+  </p:timing>
+</p:sld>
+</file>
+
+<file path=ppt/slides/slide19.xml><?xml version="1.0" encoding="utf-8"?>
+<p:sld xmlns:a="http://schemas.openxmlformats.org/drawingml/2006/main" xmlns:r="http://schemas.openxmlformats.org/officeDocument/2006/relationships" xmlns:p="http://schemas.openxmlformats.org/presentationml/2006/main">
+  <p:cSld>
+    <p:spTree>
+      <p:nvGrpSpPr>
+        <p:cNvPr id="1" name=""/>
+        <p:cNvGrpSpPr/>
+        <p:nvPr/>
+      </p:nvGrpSpPr>
+      <p:grpSpPr>
+        <a:xfrm>
+          <a:off x="0" y="0"/>
+          <a:ext cx="0" cy="0"/>
+          <a:chOff x="0" y="0"/>
+          <a:chExt cx="0" cy="0"/>
+        </a:xfrm>
+      </p:grpSpPr>
+      <p:sp>
+        <p:nvSpPr>
+          <p:cNvPr id="2" name="Title 1"/>
+          <p:cNvSpPr>
+            <a:spLocks noGrp="1"/>
+          </p:cNvSpPr>
+          <p:nvPr>
+            <p:ph type="title"/>
+          </p:nvPr>
+        </p:nvSpPr>
+        <p:spPr/>
+        <p:txBody>
+          <a:bodyPr/>
+          <a:lstStyle/>
+          <a:p>
+            <a:pPr algn="ctr"/>
+            <a:r>
+              <a:rPr lang="sv-SE" dirty="0" smtClean="0"/>
+              <a:t>Questions and feedback!</a:t>
+            </a:r>
+            <a:endParaRPr lang="sv-SE" dirty="0"/>
+          </a:p>
+        </p:txBody>
+      </p:sp>
+    </p:spTree>
+    <p:extLst>
+      <p:ext uri="{BB962C8B-B14F-4D97-AF65-F5344CB8AC3E}">
+        <p14:creationId xmlns:p14="http://schemas.microsoft.com/office/powerpoint/2010/main" val="2085757958"/>
+      </p:ext>
+    </p:extLst>
+  </p:cSld>
+  <p:clrMapOvr>
+    <a:masterClrMapping/>
+  </p:clrMapOvr>
+  <p:timing>
+    <p:tnLst>
+      <p:par>
+        <p:cTn id="1" dur="indefinite" restart="never" nodeType="tmRoot"/>
+      </p:par>
+    </p:tnLst>
+  </p:timing>
+</p:sld>
+</file>
+
+<file path=ppt/slides/slide2.xml><?xml version="1.0" encoding="utf-8"?>
+<p:sld xmlns:a="http://schemas.openxmlformats.org/drawingml/2006/main" xmlns:r="http://schemas.openxmlformats.org/officeDocument/2006/relationships" xmlns:p="http://schemas.openxmlformats.org/presentationml/2006/main">
+  <p:cSld>
+    <p:spTree>
+      <p:nvGrpSpPr>
+        <p:cNvPr id="1" name=""/>
+        <p:cNvGrpSpPr/>
+        <p:nvPr/>
+      </p:nvGrpSpPr>
+      <p:grpSpPr>
+        <a:xfrm>
+          <a:off x="0" y="0"/>
+          <a:ext cx="0" cy="0"/>
+          <a:chOff x="0" y="0"/>
+          <a:chExt cx="0" cy="0"/>
+        </a:xfrm>
+      </p:grpSpPr>
+      <p:sp>
+        <p:nvSpPr>
+          <p:cNvPr id="2" name="Title 1"/>
+          <p:cNvSpPr>
+            <a:spLocks noGrp="1"/>
+          </p:cNvSpPr>
+          <p:nvPr>
+            <p:ph type="title"/>
+          </p:nvPr>
+        </p:nvSpPr>
+        <p:spPr/>
+        <p:txBody>
+          <a:bodyPr>
+            <a:normAutofit/>
+          </a:bodyPr>
+          <a:lstStyle/>
+          <a:p>
+            <a:pPr algn="ctr"/>
+            <a:r>
+              <a:rPr lang="sv-SE" sz="5500" dirty="0" smtClean="0"/>
+              <a:t>Topics covered</a:t>
+            </a:r>
+            <a:endParaRPr lang="sv-SE" sz="5500" dirty="0"/>
+          </a:p>
+        </p:txBody>
+      </p:sp>
+      <p:sp>
+        <p:nvSpPr>
+          <p:cNvPr id="3" name="Content Placeholder 2"/>
+          <p:cNvSpPr>
+            <a:spLocks noGrp="1"/>
+          </p:cNvSpPr>
+          <p:nvPr>
+            <p:ph idx="1"/>
+          </p:nvPr>
+        </p:nvSpPr>
+        <p:spPr/>
+        <p:txBody>
+          <a:bodyPr>
+            <a:normAutofit/>
+          </a:bodyPr>
+          <a:lstStyle/>
+          <a:p>
+            <a:r>
+              <a:rPr lang="sv-SE" sz="3500" dirty="0" smtClean="0"/>
+              <a:t>Introduction</a:t>
+            </a:r>
+          </a:p>
+          <a:p>
+            <a:r>
+              <a:rPr lang="sv-SE" sz="3500" dirty="0" smtClean="0"/>
+              <a:t>Aim and purpose</a:t>
+            </a:r>
+          </a:p>
+          <a:p>
+            <a:r>
+              <a:rPr lang="sv-SE" sz="3500" dirty="0" smtClean="0"/>
+              <a:t>Method and implementation</a:t>
+            </a:r>
+          </a:p>
+          <a:p>
+            <a:r>
+              <a:rPr lang="sv-SE" sz="3500" dirty="0" smtClean="0"/>
+              <a:t>Results from this project</a:t>
+            </a:r>
+          </a:p>
+          <a:p>
+            <a:r>
+              <a:rPr lang="sv-SE" sz="3500" dirty="0"/>
+              <a:t>C</a:t>
+            </a:r>
+            <a:r>
+              <a:rPr lang="sv-SE" sz="3500" dirty="0" smtClean="0"/>
+              <a:t>onclusion</a:t>
+            </a:r>
+            <a:endParaRPr lang="sv-SE" sz="3500" dirty="0" smtClean="0"/>
+          </a:p>
+          <a:p>
+            <a:r>
+              <a:rPr lang="sv-SE" sz="3500" dirty="0" smtClean="0"/>
+              <a:t>Further work</a:t>
+            </a:r>
+            <a:endParaRPr lang="sv-SE" sz="3500" dirty="0"/>
+          </a:p>
+        </p:txBody>
+      </p:sp>
+    </p:spTree>
+    <p:extLst>
+      <p:ext uri="{BB962C8B-B14F-4D97-AF65-F5344CB8AC3E}">
+        <p14:creationId xmlns:p14="http://schemas.microsoft.com/office/powerpoint/2010/main" val="3119092434"/>
+      </p:ext>
+    </p:extLst>
+  </p:cSld>
+  <p:clrMapOvr>
+    <a:masterClrMapping/>
+  </p:clrMapOvr>
+  <p:timing>
+    <p:tnLst>
+      <p:par>
+        <p:cTn id="1" dur="indefinite" restart="never" nodeType="tmRoot"/>
+      </p:par>
+    </p:tnLst>
+  </p:timing>
+</p:sld>
+</file>
+
+<file path=ppt/slides/slide3.xml><?xml version="1.0" encoding="utf-8"?>
+<p:sld xmlns:a="http://schemas.openxmlformats.org/drawingml/2006/main" xmlns:r="http://schemas.openxmlformats.org/officeDocument/2006/relationships" xmlns:p="http://schemas.openxmlformats.org/presentationml/2006/main">
+  <p:cSld>
+    <p:spTree>
+      <p:nvGrpSpPr>
+        <p:cNvPr id="1" name=""/>
+        <p:cNvGrpSpPr/>
+        <p:nvPr/>
+      </p:nvGrpSpPr>
+      <p:grpSpPr>
+        <a:xfrm>
+          <a:off x="0" y="0"/>
+          <a:ext cx="0" cy="0"/>
+          <a:chOff x="0" y="0"/>
+          <a:chExt cx="0" cy="0"/>
+        </a:xfrm>
+      </p:grpSpPr>
+      <p:sp>
+        <p:nvSpPr>
+          <p:cNvPr id="2" name="Title 1"/>
+          <p:cNvSpPr>
+            <a:spLocks noGrp="1"/>
+          </p:cNvSpPr>
+          <p:nvPr>
+            <p:ph type="title"/>
+          </p:nvPr>
+        </p:nvSpPr>
+        <p:spPr/>
+        <p:txBody>
+          <a:bodyPr>
+            <a:normAutofit/>
+          </a:bodyPr>
+          <a:lstStyle/>
+          <a:p>
+            <a:pPr algn="ctr"/>
+            <a:r>
+              <a:rPr lang="sv-SE" sz="5500" dirty="0"/>
+              <a:t>The starting idea</a:t>
+            </a:r>
+          </a:p>
+        </p:txBody>
+      </p:sp>
+      <p:sp>
+        <p:nvSpPr>
+          <p:cNvPr id="3" name="Content Placeholder 2"/>
+          <p:cNvSpPr>
+            <a:spLocks noGrp="1"/>
+          </p:cNvSpPr>
+          <p:nvPr>
+            <p:ph idx="1"/>
+          </p:nvPr>
+        </p:nvSpPr>
+        <p:spPr/>
+        <p:txBody>
+          <a:bodyPr/>
+          <a:lstStyle/>
+          <a:p>
+            <a:r>
+              <a:rPr lang="sv-SE" sz="4400" dirty="0" smtClean="0"/>
+              <a:t>A voice activated robot </a:t>
+            </a:r>
+          </a:p>
+          <a:p>
+            <a:r>
+              <a:rPr lang="sv-SE" sz="4400" dirty="0" smtClean="0"/>
+              <a:t>Voice recognition in C</a:t>
+            </a:r>
+          </a:p>
+          <a:p>
+            <a:r>
+              <a:rPr lang="sv-SE" sz="4400" dirty="0" smtClean="0"/>
+              <a:t>Robot recognizes different users </a:t>
+            </a:r>
+          </a:p>
+          <a:p>
+            <a:r>
+              <a:rPr lang="sv-SE" sz="4400" dirty="0" smtClean="0"/>
+              <a:t>Gives a voice feedback depending on user</a:t>
+            </a:r>
+          </a:p>
+          <a:p>
+            <a:endParaRPr lang="sv-SE" dirty="0" smtClean="0"/>
+          </a:p>
+          <a:p>
+            <a:endParaRPr lang="sv-SE" dirty="0"/>
+          </a:p>
+        </p:txBody>
+      </p:sp>
+    </p:spTree>
+    <p:extLst>
+      <p:ext uri="{BB962C8B-B14F-4D97-AF65-F5344CB8AC3E}">
+        <p14:creationId xmlns:p14="http://schemas.microsoft.com/office/powerpoint/2010/main" val="4066557180"/>
+      </p:ext>
+    </p:extLst>
+  </p:cSld>
+  <p:clrMapOvr>
+    <a:masterClrMapping/>
+  </p:clrMapOvr>
+  <p:timing>
+    <p:tnLst>
+      <p:par>
+        <p:cTn id="1" dur="indefinite" restart="never" nodeType="tmRoot"/>
+      </p:par>
+    </p:tnLst>
+  </p:timing>
+</p:sld>
+</file>
+
+<file path=ppt/slides/slide4.xml><?xml version="1.0" encoding="utf-8"?>
+<p:sld xmlns:a="http://schemas.openxmlformats.org/drawingml/2006/main" xmlns:r="http://schemas.openxmlformats.org/officeDocument/2006/relationships" xmlns:p="http://schemas.openxmlformats.org/presentationml/2006/main">
+  <p:cSld>
+    <p:spTree>
+      <p:nvGrpSpPr>
+        <p:cNvPr id="1" name=""/>
+        <p:cNvGrpSpPr/>
+        <p:nvPr/>
+      </p:nvGrpSpPr>
+      <p:grpSpPr>
+        <a:xfrm>
+          <a:off x="0" y="0"/>
+          <a:ext cx="0" cy="0"/>
+          <a:chOff x="0" y="0"/>
+          <a:chExt cx="0" cy="0"/>
+        </a:xfrm>
+      </p:grpSpPr>
+      <p:sp>
+        <p:nvSpPr>
+          <p:cNvPr id="2" name="Title 1"/>
+          <p:cNvSpPr>
+            <a:spLocks noGrp="1"/>
+          </p:cNvSpPr>
+          <p:nvPr>
+            <p:ph type="title"/>
+          </p:nvPr>
+        </p:nvSpPr>
+        <p:spPr/>
+        <p:txBody>
+          <a:bodyPr>
+            <a:normAutofit/>
+          </a:bodyPr>
+          <a:lstStyle/>
+          <a:p>
+            <a:pPr algn="ctr"/>
+            <a:r>
+              <a:rPr lang="sv-SE" sz="5500" dirty="0" smtClean="0"/>
+              <a:t>The actual idea</a:t>
+            </a:r>
+            <a:endParaRPr lang="sv-SE" sz="5500" dirty="0"/>
+          </a:p>
+        </p:txBody>
+      </p:sp>
+      <p:sp>
+        <p:nvSpPr>
+          <p:cNvPr id="3" name="Content Placeholder 2"/>
+          <p:cNvSpPr>
+            <a:spLocks noGrp="1"/>
+          </p:cNvSpPr>
+          <p:nvPr>
+            <p:ph idx="1"/>
+          </p:nvPr>
+        </p:nvSpPr>
+        <p:spPr/>
+        <p:txBody>
+          <a:bodyPr>
+            <a:normAutofit/>
+          </a:bodyPr>
+          <a:lstStyle/>
+          <a:p>
+            <a:r>
+              <a:rPr lang="sv-SE" sz="4400" dirty="0" smtClean="0"/>
+              <a:t>Voice controlled robot </a:t>
+            </a:r>
+          </a:p>
+          <a:p>
+            <a:r>
+              <a:rPr lang="sv-SE" sz="4400" dirty="0" smtClean="0"/>
+              <a:t>Android(java) instead of C</a:t>
+            </a:r>
+          </a:p>
+          <a:p>
+            <a:r>
+              <a:rPr lang="sv-SE" sz="4400" dirty="0" smtClean="0"/>
+              <a:t>Lit lights using voice commands</a:t>
+            </a:r>
+          </a:p>
+          <a:p>
+            <a:r>
+              <a:rPr lang="sv-SE" sz="4400" dirty="0" smtClean="0"/>
+              <a:t>Store commands in database</a:t>
+            </a:r>
+            <a:endParaRPr lang="sv-SE" sz="4400" dirty="0" smtClean="0"/>
+          </a:p>
+          <a:p>
+            <a:endParaRPr lang="sv-SE" dirty="0"/>
+          </a:p>
+        </p:txBody>
+      </p:sp>
+    </p:spTree>
+    <p:extLst>
+      <p:ext uri="{BB962C8B-B14F-4D97-AF65-F5344CB8AC3E}">
+        <p14:creationId xmlns:p14="http://schemas.microsoft.com/office/powerpoint/2010/main" val="2370076997"/>
+      </p:ext>
+    </p:extLst>
+  </p:cSld>
+  <p:clrMapOvr>
+    <a:masterClrMapping/>
+  </p:clrMapOvr>
+  <p:timing>
+    <p:tnLst>
+      <p:par>
+        <p:cTn id="1" dur="indefinite" restart="never" nodeType="tmRoot"/>
+      </p:par>
+    </p:tnLst>
+  </p:timing>
+</p:sld>
+</file>
+
+<file path=ppt/slides/slide5.xml><?xml version="1.0" encoding="utf-8"?>
+<p:sld xmlns:a="http://schemas.openxmlformats.org/drawingml/2006/main" xmlns:r="http://schemas.openxmlformats.org/officeDocument/2006/relationships" xmlns:p="http://schemas.openxmlformats.org/presentationml/2006/main">
+  <p:cSld>
+    <p:spTree>
+      <p:nvGrpSpPr>
+        <p:cNvPr id="1" name=""/>
+        <p:cNvGrpSpPr/>
+        <p:nvPr/>
+      </p:nvGrpSpPr>
+      <p:grpSpPr>
+        <a:xfrm>
+          <a:off x="0" y="0"/>
+          <a:ext cx="0" cy="0"/>
+          <a:chOff x="0" y="0"/>
+          <a:chExt cx="0" cy="0"/>
+        </a:xfrm>
+      </p:grpSpPr>
+      <p:sp>
+        <p:nvSpPr>
+          <p:cNvPr id="2" name="Title 1"/>
+          <p:cNvSpPr>
+            <a:spLocks noGrp="1"/>
+          </p:cNvSpPr>
+          <p:nvPr>
+            <p:ph type="title"/>
+          </p:nvPr>
+        </p:nvSpPr>
+        <p:spPr/>
+        <p:txBody>
+          <a:bodyPr/>
+          <a:lstStyle/>
+          <a:p>
+            <a:pPr algn="ctr"/>
+            <a:r>
+              <a:rPr lang="sv-SE" dirty="0" smtClean="0"/>
+              <a:t>Hardware and software used</a:t>
+            </a:r>
+            <a:endParaRPr lang="sv-SE" dirty="0"/>
+          </a:p>
+        </p:txBody>
+      </p:sp>
+      <p:sp>
+        <p:nvSpPr>
+          <p:cNvPr id="3" name="Content Placeholder 2"/>
+          <p:cNvSpPr>
+            <a:spLocks noGrp="1"/>
+          </p:cNvSpPr>
+          <p:nvPr>
+            <p:ph idx="1"/>
+          </p:nvPr>
+        </p:nvSpPr>
+        <p:spPr/>
+        <p:txBody>
+          <a:bodyPr/>
+          <a:lstStyle/>
+          <a:p>
+            <a:r>
+              <a:rPr lang="sv-SE" sz="4400" dirty="0" smtClean="0"/>
+              <a:t>Arduino atmega328p</a:t>
+            </a:r>
+          </a:p>
+          <a:p>
+            <a:r>
+              <a:rPr lang="sv-SE" sz="4400" dirty="0" smtClean="0"/>
+              <a:t>Android studio</a:t>
+            </a:r>
+          </a:p>
+          <a:p>
+            <a:r>
+              <a:rPr lang="sv-SE" sz="4400" dirty="0" smtClean="0"/>
+              <a:t>SQLite</a:t>
+            </a:r>
+          </a:p>
+          <a:p>
+            <a:endParaRPr lang="sv-SE" dirty="0"/>
+          </a:p>
+        </p:txBody>
+      </p:sp>
+    </p:spTree>
+    <p:extLst>
+      <p:ext uri="{BB962C8B-B14F-4D97-AF65-F5344CB8AC3E}">
+        <p14:creationId xmlns:p14="http://schemas.microsoft.com/office/powerpoint/2010/main" val="722806150"/>
+      </p:ext>
+    </p:extLst>
+  </p:cSld>
+  <p:clrMapOvr>
+    <a:masterClrMapping/>
+  </p:clrMapOvr>
+  <p:timing>
+    <p:tnLst>
+      <p:par>
+        <p:cTn id="1" dur="indefinite" restart="never" nodeType="tmRoot"/>
+      </p:par>
+    </p:tnLst>
+  </p:timing>
+</p:sld>
+</file>
+
+<file path=ppt/slides/slide6.xml><?xml version="1.0" encoding="utf-8"?>
+<p:sld xmlns:a="http://schemas.openxmlformats.org/drawingml/2006/main" xmlns:r="http://schemas.openxmlformats.org/officeDocument/2006/relationships" xmlns:p="http://schemas.openxmlformats.org/presentationml/2006/main">
+  <p:cSld>
+    <p:spTree>
+      <p:nvGrpSpPr>
+        <p:cNvPr id="1" name=""/>
+        <p:cNvGrpSpPr/>
+        <p:nvPr/>
+      </p:nvGrpSpPr>
+      <p:grpSpPr>
+        <a:xfrm>
+          <a:off x="0" y="0"/>
+          <a:ext cx="0" cy="0"/>
+          <a:chOff x="0" y="0"/>
+          <a:chExt cx="0" cy="0"/>
+        </a:xfrm>
+      </p:grpSpPr>
+      <p:sp>
+        <p:nvSpPr>
+          <p:cNvPr id="2" name="Title 1"/>
+          <p:cNvSpPr>
+            <a:spLocks noGrp="1"/>
+          </p:cNvSpPr>
+          <p:nvPr>
+            <p:ph type="title"/>
+          </p:nvPr>
+        </p:nvSpPr>
+        <p:spPr/>
+        <p:txBody>
+          <a:bodyPr/>
+          <a:lstStyle/>
+          <a:p>
+            <a:pPr algn="ctr"/>
+            <a:r>
+              <a:rPr lang="sv-SE" dirty="0" smtClean="0"/>
+              <a:t>Aim and purpose</a:t>
+            </a:r>
+            <a:endParaRPr lang="sv-SE" dirty="0"/>
+          </a:p>
+        </p:txBody>
+      </p:sp>
+      <p:sp>
+        <p:nvSpPr>
+          <p:cNvPr id="3" name="Content Placeholder 2"/>
+          <p:cNvSpPr>
+            <a:spLocks noGrp="1"/>
+          </p:cNvSpPr>
+          <p:nvPr>
+            <p:ph idx="1"/>
+          </p:nvPr>
+        </p:nvSpPr>
+        <p:spPr/>
+        <p:txBody>
+          <a:bodyPr/>
+          <a:lstStyle/>
+          <a:p>
+            <a:r>
+              <a:rPr lang="sv-SE" sz="4400" dirty="0" smtClean="0"/>
+              <a:t>Voice recognition application</a:t>
+            </a:r>
+          </a:p>
+          <a:p>
+            <a:r>
+              <a:rPr lang="sv-SE" sz="4400" dirty="0" smtClean="0"/>
+              <a:t>Store commands </a:t>
+            </a:r>
+          </a:p>
+          <a:p>
+            <a:r>
+              <a:rPr lang="sv-SE" sz="4400" dirty="0" smtClean="0"/>
+              <a:t>Return commands in text</a:t>
+            </a:r>
+          </a:p>
+          <a:p>
+            <a:endParaRPr lang="sv-SE" dirty="0"/>
+          </a:p>
+        </p:txBody>
+      </p:sp>
+    </p:spTree>
+    <p:extLst>
+      <p:ext uri="{BB962C8B-B14F-4D97-AF65-F5344CB8AC3E}">
+        <p14:creationId xmlns:p14="http://schemas.microsoft.com/office/powerpoint/2010/main" val="1497136827"/>
+      </p:ext>
+    </p:extLst>
+  </p:cSld>
+  <p:clrMapOvr>
+    <a:masterClrMapping/>
+  </p:clrMapOvr>
+  <p:timing>
+    <p:tnLst>
+      <p:par>
+        <p:cTn id="1" dur="indefinite" restart="never" nodeType="tmRoot"/>
+      </p:par>
+    </p:tnLst>
+  </p:timing>
+</p:sld>
+</file>
+
 <file path=ppt/slides/slide7.xml><?xml version="1.0" encoding="utf-8"?>
 <p:sld xmlns:a="http://schemas.openxmlformats.org/drawingml/2006/main" xmlns:r="http://schemas.openxmlformats.org/officeDocument/2006/relationships" xmlns:p="http://schemas.openxmlformats.org/presentationml/2006/main">
   <p:cSld>
@@ -4993,94 +6065,55 @@
             <p:ph type="title"/>
           </p:nvPr>
         </p:nvSpPr>
-        <p:spPr>
-          <a:xfrm>
-            <a:off x="2339752" y="260648"/>
-            <a:ext cx="8229600" cy="1143000"/>
-          </a:xfrm>
-        </p:spPr>
+        <p:spPr/>
+        <p:txBody>
+          <a:bodyPr/>
+          <a:lstStyle/>
+          <a:p>
+            <a:pPr algn="ctr"/>
+            <a:r>
+              <a:rPr lang="sv-SE" dirty="0" smtClean="0"/>
+              <a:t>Research questions</a:t>
+            </a:r>
+            <a:endParaRPr lang="sv-SE" dirty="0"/>
+          </a:p>
+        </p:txBody>
+      </p:sp>
+      <p:sp>
+        <p:nvSpPr>
+          <p:cNvPr id="3" name="Content Placeholder 2"/>
+          <p:cNvSpPr>
+            <a:spLocks noGrp="1"/>
+          </p:cNvSpPr>
+          <p:nvPr>
+            <p:ph idx="1"/>
+          </p:nvPr>
+        </p:nvSpPr>
+        <p:spPr/>
         <p:txBody>
           <a:bodyPr>
             <a:normAutofit/>
           </a:bodyPr>
           <a:lstStyle/>
           <a:p>
-            <a:pPr algn="ctr"/>
-            <a:r>
-              <a:rPr lang="sv-SE" sz="5500" dirty="0" smtClean="0"/>
-              <a:t>SQlite Database </a:t>
-            </a:r>
-            <a:endParaRPr lang="sv-SE" sz="5500" dirty="0"/>
-          </a:p>
-        </p:txBody>
-      </p:sp>
-      <p:pic>
-        <p:nvPicPr>
-          <p:cNvPr id="5" name="Content Placeholder 4"/>
-          <p:cNvPicPr>
-            <a:picLocks noGrp="1" noChangeAspect="1"/>
-          </p:cNvPicPr>
-          <p:nvPr>
-            <p:ph sz="half" idx="1"/>
-          </p:nvPr>
-        </p:nvPicPr>
-        <p:blipFill>
-          <a:blip r:embed="rId2" cstate="print">
-            <a:extLst>
-              <a:ext uri="{28A0092B-C50C-407E-A947-70E740481C1C}">
-                <a14:useLocalDpi xmlns:a14="http://schemas.microsoft.com/office/drawing/2010/main" val="0"/>
-              </a:ext>
-            </a:extLst>
-          </a:blip>
-          <a:stretch>
-            <a:fillRect/>
-          </a:stretch>
-        </p:blipFill>
-        <p:spPr>
-          <a:xfrm>
-            <a:off x="179512" y="188640"/>
-            <a:ext cx="3384000" cy="6016000"/>
-          </a:xfrm>
-        </p:spPr>
-      </p:pic>
-      <p:sp>
-        <p:nvSpPr>
-          <p:cNvPr id="4" name="Content Placeholder 3"/>
-          <p:cNvSpPr>
-            <a:spLocks noGrp="1"/>
-          </p:cNvSpPr>
-          <p:nvPr>
-            <p:ph sz="half" idx="2"/>
-          </p:nvPr>
-        </p:nvSpPr>
-        <p:spPr>
-          <a:xfrm>
-            <a:off x="4355976" y="2060848"/>
-            <a:ext cx="4038600" cy="4434840"/>
-          </a:xfrm>
-        </p:spPr>
-        <p:txBody>
-          <a:bodyPr/>
-          <a:lstStyle/>
-          <a:p>
-            <a:r>
-              <a:rPr lang="sv-SE" dirty="0" smtClean="0"/>
-              <a:t>This is the database containing the command history</a:t>
-            </a:r>
-          </a:p>
-          <a:p>
-            <a:r>
-              <a:rPr lang="sv-SE" dirty="0" smtClean="0"/>
-              <a:t>Why?</a:t>
-            </a:r>
-            <a:endParaRPr lang="sv-SE" dirty="0"/>
+            <a:r>
+              <a:rPr lang="sv-SE" sz="4400" dirty="0" smtClean="0"/>
+              <a:t>How can we make voice recgonition a more reliable input?</a:t>
+            </a:r>
+          </a:p>
+          <a:p>
+            <a:r>
+              <a:rPr lang="sv-SE" sz="4400" dirty="0" smtClean="0"/>
+              <a:t>How can voice recognition be used to improve the quality of life?</a:t>
+            </a:r>
+            <a:endParaRPr lang="sv-SE" sz="4400" dirty="0"/>
           </a:p>
         </p:txBody>
       </p:sp>
     </p:spTree>
     <p:extLst>
       <p:ext uri="{BB962C8B-B14F-4D97-AF65-F5344CB8AC3E}">
-        <p14:creationId xmlns:p14="http://schemas.microsoft.com/office/powerpoint/2010/main" val="2777704850"/>
+        <p14:creationId xmlns:p14="http://schemas.microsoft.com/office/powerpoint/2010/main" val="2174888162"/>
       </p:ext>
     </p:extLst>
   </p:cSld>
@@ -5124,79 +6157,67 @@
             <p:ph type="title"/>
           </p:nvPr>
         </p:nvSpPr>
-        <p:spPr>
-          <a:xfrm>
-            <a:off x="2267744" y="260648"/>
-            <a:ext cx="8229600" cy="1143000"/>
-          </a:xfrm>
-        </p:spPr>
+        <p:spPr/>
+        <p:txBody>
+          <a:bodyPr/>
+          <a:lstStyle/>
+          <a:p>
+            <a:pPr algn="ctr"/>
+            <a:r>
+              <a:rPr lang="sv-SE" dirty="0" smtClean="0"/>
+              <a:t>Method and implementation</a:t>
+            </a:r>
+            <a:endParaRPr lang="sv-SE" dirty="0"/>
+          </a:p>
+        </p:txBody>
+      </p:sp>
+      <p:sp>
+        <p:nvSpPr>
+          <p:cNvPr id="3" name="Content Placeholder 2"/>
+          <p:cNvSpPr>
+            <a:spLocks noGrp="1"/>
+          </p:cNvSpPr>
+          <p:nvPr>
+            <p:ph idx="1"/>
+          </p:nvPr>
+        </p:nvSpPr>
+        <p:spPr/>
         <p:txBody>
           <a:bodyPr>
             <a:normAutofit/>
           </a:bodyPr>
           <a:lstStyle/>
           <a:p>
-            <a:pPr algn="ctr"/>
-            <a:r>
-              <a:rPr lang="sv-SE" sz="5500" dirty="0" smtClean="0"/>
+            <a:r>
+              <a:rPr lang="sv-SE" sz="4400" dirty="0" smtClean="0"/>
+              <a:t>Android </a:t>
+            </a:r>
+          </a:p>
+          <a:p>
+            <a:r>
+              <a:rPr lang="sv-SE" sz="4400" dirty="0" smtClean="0"/>
+              <a:t>Bluetooth connection</a:t>
+            </a:r>
+          </a:p>
+          <a:p>
+            <a:r>
+              <a:rPr lang="sv-SE" sz="4400" dirty="0" smtClean="0"/>
+              <a:t>SQLite</a:t>
+            </a:r>
+          </a:p>
+          <a:p>
+            <a:r>
+              <a:rPr lang="sv-SE" sz="4400" dirty="0" smtClean="0"/>
               <a:t>Arduino</a:t>
             </a:r>
-            <a:endParaRPr lang="sv-SE" sz="5500" dirty="0"/>
-          </a:p>
-        </p:txBody>
-      </p:sp>
-      <p:sp>
-        <p:nvSpPr>
-          <p:cNvPr id="4" name="Content Placeholder 3"/>
-          <p:cNvSpPr>
-            <a:spLocks noGrp="1"/>
-          </p:cNvSpPr>
-          <p:nvPr>
-            <p:ph sz="half" idx="2"/>
-          </p:nvPr>
-        </p:nvSpPr>
-        <p:spPr/>
-        <p:txBody>
-          <a:bodyPr/>
-          <a:lstStyle/>
-          <a:p>
-            <a:endParaRPr lang="sv-SE"/>
-          </a:p>
-        </p:txBody>
-      </p:sp>
-      <p:pic>
-        <p:nvPicPr>
-          <p:cNvPr id="7" name="Content Placeholder 6"/>
-          <p:cNvPicPr>
-            <a:picLocks noGrp="1" noChangeAspect="1"/>
-          </p:cNvPicPr>
-          <p:nvPr>
-            <p:ph sz="half" idx="1"/>
-          </p:nvPr>
-        </p:nvPicPr>
-        <p:blipFill>
-          <a:blip r:embed="rId2" cstate="print">
-            <a:extLst>
-              <a:ext uri="{28A0092B-C50C-407E-A947-70E740481C1C}">
-                <a14:useLocalDpi xmlns:a14="http://schemas.microsoft.com/office/drawing/2010/main" val="0"/>
-              </a:ext>
-            </a:extLst>
-          </a:blip>
-          <a:stretch>
-            <a:fillRect/>
-          </a:stretch>
-        </p:blipFill>
-        <p:spPr>
-          <a:xfrm>
-            <a:off x="251520" y="260648"/>
-            <a:ext cx="3442500" cy="6120000"/>
-          </a:xfrm>
-        </p:spPr>
-      </p:pic>
+            <a:endParaRPr lang="sv-SE" sz="4400" dirty="0"/>
+          </a:p>
+        </p:txBody>
+      </p:sp>
     </p:spTree>
     <p:extLst>
       <p:ext uri="{BB962C8B-B14F-4D97-AF65-F5344CB8AC3E}">
-        <p14:creationId xmlns:p14="http://schemas.microsoft.com/office/powerpoint/2010/main" val="2664708121"/>
+        <p14:creationId xmlns:p14="http://schemas.microsoft.com/office/powerpoint/2010/main" val="3684258648"/>
       </p:ext>
     </p:extLst>
   </p:cSld>
@@ -5242,7 +6263,7 @@
         </p:nvSpPr>
         <p:spPr>
           <a:xfrm>
-            <a:off x="2195736" y="332656"/>
+            <a:off x="755576" y="116632"/>
             <a:ext cx="8229600" cy="1143000"/>
           </a:xfrm>
         </p:spPr>
@@ -5255,15 +6276,84 @@
             <a:pPr algn="ctr"/>
             <a:r>
               <a:rPr lang="sv-SE" sz="5500" dirty="0" smtClean="0"/>
-              <a:t>Leif v 0.1</a:t>
+              <a:t>                Android</a:t>
             </a:r>
             <a:endParaRPr lang="sv-SE" sz="5500" dirty="0"/>
+          </a:p>
+        </p:txBody>
+      </p:sp>
+      <p:sp>
+        <p:nvSpPr>
+          <p:cNvPr id="5" name="Content Placeholder 4"/>
+          <p:cNvSpPr>
+            <a:spLocks noGrp="1"/>
+          </p:cNvSpPr>
+          <p:nvPr>
+            <p:ph sz="half" idx="2"/>
+          </p:nvPr>
+        </p:nvSpPr>
+        <p:spPr>
+          <a:xfrm>
+            <a:off x="4139952" y="1988840"/>
+            <a:ext cx="4038600" cy="4434840"/>
+          </a:xfrm>
+        </p:spPr>
+        <p:txBody>
+          <a:bodyPr>
+            <a:noAutofit/>
+          </a:bodyPr>
+          <a:lstStyle/>
+          <a:p>
+            <a:r>
+              <a:rPr lang="sv-SE" sz="2400" dirty="0" smtClean="0"/>
+              <a:t>This is the EasySpeech app</a:t>
+            </a:r>
+          </a:p>
+          <a:p>
+            <a:r>
+              <a:rPr lang="sv-SE" sz="2400" dirty="0" smtClean="0"/>
+              <a:t>Speech to text</a:t>
+            </a:r>
+          </a:p>
+          <a:p>
+            <a:r>
+              <a:rPr lang="sv-SE" sz="2400" dirty="0" smtClean="0"/>
+              <a:t>On activity results</a:t>
+            </a:r>
+          </a:p>
+          <a:p>
+            <a:pPr lvl="1"/>
+            <a:r>
+              <a:rPr lang="sv-SE" sz="2200" dirty="0" smtClean="0"/>
+              <a:t>Print command</a:t>
+            </a:r>
+          </a:p>
+          <a:p>
+            <a:pPr lvl="1"/>
+            <a:r>
+              <a:rPr lang="sv-SE" sz="2200" dirty="0" smtClean="0"/>
+              <a:t>Switch</a:t>
+            </a:r>
+          </a:p>
+          <a:p>
+            <a:pPr lvl="1"/>
+            <a:r>
+              <a:rPr lang="sv-SE" sz="2200" dirty="0" smtClean="0"/>
+              <a:t>Bluetooth</a:t>
+            </a:r>
+          </a:p>
+          <a:p>
+            <a:pPr lvl="1"/>
+            <a:endParaRPr lang="sv-SE" sz="2200" dirty="0" smtClean="0"/>
+          </a:p>
+          <a:p>
+            <a:endParaRPr lang="sv-SE" sz="2400" dirty="0"/>
           </a:p>
         </p:txBody>
       </p:sp>
       <p:pic>
         <p:nvPicPr>
-          <p:cNvPr id="5" name="Content Placeholder 4"/>
+          <p:cNvPr id="7" name="Content Placeholder 6"/>
           <p:cNvPicPr>
             <a:picLocks noGrp="1" noChangeAspect="1"/>
           </p:cNvPicPr>
@@ -5285,50 +6375,15 @@
         </p:blipFill>
         <p:spPr>
           <a:xfrm>
-            <a:off x="323528" y="260648"/>
-            <a:ext cx="3442500" cy="6120000"/>
+            <a:off x="6315" y="-32248"/>
+            <a:ext cx="3810308" cy="6890248"/>
           </a:xfrm>
         </p:spPr>
       </p:pic>
-      <p:sp>
-        <p:nvSpPr>
-          <p:cNvPr id="4" name="Content Placeholder 3"/>
-          <p:cNvSpPr>
-            <a:spLocks noGrp="1"/>
-          </p:cNvSpPr>
-          <p:nvPr>
-            <p:ph sz="half" idx="2"/>
-          </p:nvPr>
-        </p:nvSpPr>
-        <p:spPr/>
-        <p:txBody>
-          <a:bodyPr/>
-          <a:lstStyle/>
-          <a:p>
-            <a:r>
-              <a:rPr lang="sv-SE" dirty="0" smtClean="0"/>
-              <a:t>This is Leif</a:t>
-            </a:r>
-          </a:p>
-          <a:p>
-            <a:r>
-              <a:rPr lang="sv-SE" dirty="0" smtClean="0"/>
-              <a:t>He knows not much, but the lights on his limbs but happy he is anyway </a:t>
-            </a:r>
-          </a:p>
-          <a:p>
-            <a:r>
-              <a:rPr lang="sv-SE" dirty="0" smtClean="0"/>
-              <a:t>The best thing he knows is hiding in the bushes and catch small children exept he sucks at it, they see him coming miles away.</a:t>
-            </a:r>
-            <a:endParaRPr lang="sv-SE" dirty="0"/>
-          </a:p>
-        </p:txBody>
-      </p:sp>
     </p:spTree>
     <p:extLst>
       <p:ext uri="{BB962C8B-B14F-4D97-AF65-F5344CB8AC3E}">
-        <p14:creationId xmlns:p14="http://schemas.microsoft.com/office/powerpoint/2010/main" val="1230355258"/>
+        <p14:creationId xmlns:p14="http://schemas.microsoft.com/office/powerpoint/2010/main" val="2615452909"/>
       </p:ext>
     </p:extLst>
   </p:cSld>

</xml_diff>